<commit_message>
Color and font correcting power point
</commit_message>
<xml_diff>
--- a/Datathon_Presentation.pptx
+++ b/Datathon_Presentation.pptx
@@ -2792,10 +2792,14 @@
         <a:lstStyle/>
         <a:p>
           <a:r>
-            <a:rPr lang="en-US" b="0" i="0" dirty="0"/>
+            <a:rPr lang="en-US" b="0" i="0" dirty="0">
+              <a:latin typeface="Georgia" panose="02040502050405020303" pitchFamily="18" charset="0"/>
+            </a:rPr>
             <a:t>Brief overview of datasets used</a:t>
           </a:r>
-          <a:endParaRPr lang="en-US" dirty="0"/>
+          <a:endParaRPr lang="en-US" dirty="0">
+            <a:latin typeface="Georgia" panose="02040502050405020303" pitchFamily="18" charset="0"/>
+          </a:endParaRPr>
         </a:p>
       </dgm:t>
     </dgm:pt>
@@ -2829,10 +2833,14 @@
         <a:lstStyle/>
         <a:p>
           <a:r>
-            <a:rPr lang="en-US" b="0" i="0"/>
+            <a:rPr lang="en-US" b="0" i="0" dirty="0">
+              <a:latin typeface="Georgia" panose="02040502050405020303" pitchFamily="18" charset="0"/>
+            </a:rPr>
             <a:t>Key data preparation steps (cleaning, transformations)</a:t>
           </a:r>
-          <a:endParaRPr lang="en-US"/>
+          <a:endParaRPr lang="en-US" dirty="0">
+            <a:latin typeface="Georgia" panose="02040502050405020303" pitchFamily="18" charset="0"/>
+          </a:endParaRPr>
         </a:p>
       </dgm:t>
     </dgm:pt>
@@ -2866,10 +2874,14 @@
         <a:lstStyle/>
         <a:p>
           <a:r>
-            <a:rPr lang="en-US" b="0" i="0"/>
+            <a:rPr lang="en-US" b="0" i="0">
+              <a:latin typeface="Georgia" panose="02040502050405020303" pitchFamily="18" charset="0"/>
+            </a:rPr>
             <a:t>Analytics methods used</a:t>
           </a:r>
-          <a:endParaRPr lang="en-US"/>
+          <a:endParaRPr lang="en-US">
+            <a:latin typeface="Georgia" panose="02040502050405020303" pitchFamily="18" charset="0"/>
+          </a:endParaRPr>
         </a:p>
       </dgm:t>
     </dgm:pt>
@@ -2903,10 +2915,14 @@
         <a:lstStyle/>
         <a:p>
           <a:r>
-            <a:rPr lang="en-US" b="0" i="0"/>
+            <a:rPr lang="en-US" b="0" i="0">
+              <a:latin typeface="Georgia" panose="02040502050405020303" pitchFamily="18" charset="0"/>
+            </a:rPr>
             <a:t>Why those methods were appropriate</a:t>
           </a:r>
-          <a:endParaRPr lang="en-US"/>
+          <a:endParaRPr lang="en-US">
+            <a:latin typeface="Georgia" panose="02040502050405020303" pitchFamily="18" charset="0"/>
+          </a:endParaRPr>
         </a:p>
       </dgm:t>
     </dgm:pt>
@@ -3035,7 +3051,9 @@
         <a:lstStyle/>
         <a:p>
           <a:r>
-            <a:rPr lang="en-US" dirty="0"/>
+            <a:rPr lang="en-US" dirty="0">
+              <a:latin typeface="Georgia" panose="02040502050405020303" pitchFamily="18" charset="0"/>
+            </a:rPr>
             <a:t>Your company needs this</a:t>
           </a:r>
         </a:p>
@@ -3071,7 +3089,9 @@
         <a:lstStyle/>
         <a:p>
           <a:r>
-            <a:rPr lang="en-US" dirty="0"/>
+            <a:rPr lang="en-US" dirty="0">
+              <a:latin typeface="Georgia" panose="02040502050405020303" pitchFamily="18" charset="0"/>
+            </a:rPr>
             <a:t>This will solve these things from the insights</a:t>
           </a:r>
         </a:p>
@@ -3107,7 +3127,9 @@
         <a:lstStyle/>
         <a:p>
           <a:r>
-            <a:rPr lang="en-US"/>
+            <a:rPr lang="en-US" dirty="0">
+              <a:latin typeface="Georgia" panose="02040502050405020303" pitchFamily="18" charset="0"/>
+            </a:rPr>
             <a:t>Data 1</a:t>
           </a:r>
         </a:p>
@@ -3143,7 +3165,9 @@
         <a:lstStyle/>
         <a:p>
           <a:r>
-            <a:rPr lang="en-US"/>
+            <a:rPr lang="en-US" dirty="0">
+              <a:latin typeface="Georgia" panose="02040502050405020303" pitchFamily="18" charset="0"/>
+            </a:rPr>
             <a:t>Data 2</a:t>
           </a:r>
         </a:p>
@@ -3179,19 +3203,27 @@
         <a:lstStyle/>
         <a:p>
           <a:r>
-            <a:rPr lang="en-US" dirty="0" err="1"/>
+            <a:rPr lang="en-US" dirty="0" err="1">
+              <a:latin typeface="Georgia" panose="02040502050405020303" pitchFamily="18" charset="0"/>
+            </a:rPr>
             <a:t>Hee</a:t>
           </a:r>
           <a:r>
-            <a:rPr lang="en-US" dirty="0"/>
+            <a:rPr lang="en-US" dirty="0">
+              <a:latin typeface="Georgia" panose="02040502050405020303" pitchFamily="18" charset="0"/>
+            </a:rPr>
             <a:t> </a:t>
           </a:r>
           <a:r>
-            <a:rPr lang="en-US" dirty="0" err="1"/>
+            <a:rPr lang="en-US" dirty="0" err="1">
+              <a:latin typeface="Georgia" panose="02040502050405020303" pitchFamily="18" charset="0"/>
+            </a:rPr>
             <a:t>hee</a:t>
           </a:r>
           <a:r>
-            <a:rPr lang="en-US" dirty="0"/>
+            <a:rPr lang="en-US" dirty="0">
+              <a:latin typeface="Georgia" panose="02040502050405020303" pitchFamily="18" charset="0"/>
+            </a:rPr>
             <a:t> ha ha</a:t>
           </a:r>
         </a:p>
@@ -3824,12 +3856,12 @@
         </a:fontRef>
       </dsp:style>
       <dsp:txBody>
-        <a:bodyPr spcFirstLastPara="0" vert="horz" wrap="square" lIns="72390" tIns="72390" rIns="72390" bIns="72390" numCol="1" spcCol="1270" anchor="ctr" anchorCtr="0">
+        <a:bodyPr spcFirstLastPara="0" vert="horz" wrap="square" lIns="76200" tIns="76200" rIns="76200" bIns="76200" numCol="1" spcCol="1270" anchor="ctr" anchorCtr="0">
           <a:noAutofit/>
         </a:bodyPr>
         <a:lstStyle/>
         <a:p>
-          <a:pPr marL="0" lvl="0" indent="0" algn="ctr" defTabSz="844550">
+          <a:pPr marL="0" lvl="0" indent="0" algn="ctr" defTabSz="889000">
             <a:lnSpc>
               <a:spcPct val="90000"/>
             </a:lnSpc>
@@ -3842,10 +3874,14 @@
             <a:buNone/>
           </a:pPr>
           <a:r>
-            <a:rPr lang="en-US" sz="1900" b="0" i="0" kern="1200" dirty="0"/>
+            <a:rPr lang="en-US" sz="2000" b="0" i="0" kern="1200" dirty="0">
+              <a:latin typeface="Georgia" panose="02040502050405020303" pitchFamily="18" charset="0"/>
+            </a:rPr>
             <a:t>Brief overview of datasets used</a:t>
           </a:r>
-          <a:endParaRPr lang="en-US" sz="1900" kern="1200" dirty="0"/>
+          <a:endParaRPr lang="en-US" sz="2000" kern="1200" dirty="0">
+            <a:latin typeface="Georgia" panose="02040502050405020303" pitchFamily="18" charset="0"/>
+          </a:endParaRPr>
         </a:p>
       </dsp:txBody>
       <dsp:txXfrm>
@@ -3894,12 +3930,12 @@
         </a:fontRef>
       </dsp:style>
       <dsp:txBody>
-        <a:bodyPr spcFirstLastPara="0" vert="horz" wrap="square" lIns="72390" tIns="72390" rIns="72390" bIns="72390" numCol="1" spcCol="1270" anchor="ctr" anchorCtr="0">
+        <a:bodyPr spcFirstLastPara="0" vert="horz" wrap="square" lIns="76200" tIns="76200" rIns="76200" bIns="76200" numCol="1" spcCol="1270" anchor="ctr" anchorCtr="0">
           <a:noAutofit/>
         </a:bodyPr>
         <a:lstStyle/>
         <a:p>
-          <a:pPr marL="0" lvl="0" indent="0" algn="ctr" defTabSz="844550">
+          <a:pPr marL="0" lvl="0" indent="0" algn="ctr" defTabSz="889000">
             <a:lnSpc>
               <a:spcPct val="90000"/>
             </a:lnSpc>
@@ -3912,10 +3948,14 @@
             <a:buNone/>
           </a:pPr>
           <a:r>
-            <a:rPr lang="en-US" sz="1900" b="0" i="0" kern="1200"/>
+            <a:rPr lang="en-US" sz="2000" b="0" i="0" kern="1200" dirty="0">
+              <a:latin typeface="Georgia" panose="02040502050405020303" pitchFamily="18" charset="0"/>
+            </a:rPr>
             <a:t>Key data preparation steps (cleaning, transformations)</a:t>
           </a:r>
-          <a:endParaRPr lang="en-US" sz="1900" kern="1200"/>
+          <a:endParaRPr lang="en-US" sz="2000" kern="1200" dirty="0">
+            <a:latin typeface="Georgia" panose="02040502050405020303" pitchFamily="18" charset="0"/>
+          </a:endParaRPr>
         </a:p>
       </dsp:txBody>
       <dsp:txXfrm>
@@ -3964,12 +4004,12 @@
         </a:fontRef>
       </dsp:style>
       <dsp:txBody>
-        <a:bodyPr spcFirstLastPara="0" vert="horz" wrap="square" lIns="72390" tIns="72390" rIns="72390" bIns="72390" numCol="1" spcCol="1270" anchor="ctr" anchorCtr="0">
+        <a:bodyPr spcFirstLastPara="0" vert="horz" wrap="square" lIns="76200" tIns="76200" rIns="76200" bIns="76200" numCol="1" spcCol="1270" anchor="ctr" anchorCtr="0">
           <a:noAutofit/>
         </a:bodyPr>
         <a:lstStyle/>
         <a:p>
-          <a:pPr marL="0" lvl="0" indent="0" algn="ctr" defTabSz="844550">
+          <a:pPr marL="0" lvl="0" indent="0" algn="ctr" defTabSz="889000">
             <a:lnSpc>
               <a:spcPct val="90000"/>
             </a:lnSpc>
@@ -3982,10 +4022,14 @@
             <a:buNone/>
           </a:pPr>
           <a:r>
-            <a:rPr lang="en-US" sz="1900" b="0" i="0" kern="1200"/>
+            <a:rPr lang="en-US" sz="2000" b="0" i="0" kern="1200">
+              <a:latin typeface="Georgia" panose="02040502050405020303" pitchFamily="18" charset="0"/>
+            </a:rPr>
             <a:t>Analytics methods used</a:t>
           </a:r>
-          <a:endParaRPr lang="en-US" sz="1900" kern="1200"/>
+          <a:endParaRPr lang="en-US" sz="2000" kern="1200">
+            <a:latin typeface="Georgia" panose="02040502050405020303" pitchFamily="18" charset="0"/>
+          </a:endParaRPr>
         </a:p>
       </dsp:txBody>
       <dsp:txXfrm>
@@ -4034,12 +4078,12 @@
         </a:fontRef>
       </dsp:style>
       <dsp:txBody>
-        <a:bodyPr spcFirstLastPara="0" vert="horz" wrap="square" lIns="72390" tIns="72390" rIns="72390" bIns="72390" numCol="1" spcCol="1270" anchor="ctr" anchorCtr="0">
+        <a:bodyPr spcFirstLastPara="0" vert="horz" wrap="square" lIns="76200" tIns="76200" rIns="76200" bIns="76200" numCol="1" spcCol="1270" anchor="ctr" anchorCtr="0">
           <a:noAutofit/>
         </a:bodyPr>
         <a:lstStyle/>
         <a:p>
-          <a:pPr marL="0" lvl="0" indent="0" algn="ctr" defTabSz="844550">
+          <a:pPr marL="0" lvl="0" indent="0" algn="ctr" defTabSz="889000">
             <a:lnSpc>
               <a:spcPct val="90000"/>
             </a:lnSpc>
@@ -4052,10 +4096,14 @@
             <a:buNone/>
           </a:pPr>
           <a:r>
-            <a:rPr lang="en-US" sz="1900" b="0" i="0" kern="1200"/>
+            <a:rPr lang="en-US" sz="2000" b="0" i="0" kern="1200">
+              <a:latin typeface="Georgia" panose="02040502050405020303" pitchFamily="18" charset="0"/>
+            </a:rPr>
             <a:t>Why those methods were appropriate</a:t>
           </a:r>
-          <a:endParaRPr lang="en-US" sz="1900" kern="1200"/>
+          <a:endParaRPr lang="en-US" sz="2000" kern="1200">
+            <a:latin typeface="Georgia" panose="02040502050405020303" pitchFamily="18" charset="0"/>
+          </a:endParaRPr>
         </a:p>
       </dsp:txBody>
       <dsp:txXfrm>
@@ -4215,7 +4263,9 @@
             <a:buNone/>
           </a:pPr>
           <a:r>
-            <a:rPr lang="en-US" sz="1900" kern="1200" dirty="0"/>
+            <a:rPr lang="en-US" sz="1900" kern="1200" dirty="0">
+              <a:latin typeface="Georgia" panose="02040502050405020303" pitchFamily="18" charset="0"/>
+            </a:rPr>
             <a:t>Your company needs this</a:t>
           </a:r>
         </a:p>
@@ -4365,7 +4415,9 @@
             <a:buNone/>
           </a:pPr>
           <a:r>
-            <a:rPr lang="en-US" sz="1900" kern="1200" dirty="0"/>
+            <a:rPr lang="en-US" sz="1900" kern="1200" dirty="0">
+              <a:latin typeface="Georgia" panose="02040502050405020303" pitchFamily="18" charset="0"/>
+            </a:rPr>
             <a:t>This will solve these things from the insights</a:t>
           </a:r>
         </a:p>
@@ -4515,7 +4567,9 @@
             <a:buNone/>
           </a:pPr>
           <a:r>
-            <a:rPr lang="en-US" sz="1900" kern="1200"/>
+            <a:rPr lang="en-US" sz="1900" kern="1200" dirty="0">
+              <a:latin typeface="Georgia" panose="02040502050405020303" pitchFamily="18" charset="0"/>
+            </a:rPr>
             <a:t>Data 1</a:t>
           </a:r>
         </a:p>
@@ -4665,7 +4719,9 @@
             <a:buNone/>
           </a:pPr>
           <a:r>
-            <a:rPr lang="en-US" sz="1900" kern="1200"/>
+            <a:rPr lang="en-US" sz="1900" kern="1200" dirty="0">
+              <a:latin typeface="Georgia" panose="02040502050405020303" pitchFamily="18" charset="0"/>
+            </a:rPr>
             <a:t>Data 2</a:t>
           </a:r>
         </a:p>
@@ -4815,19 +4871,27 @@
             <a:buNone/>
           </a:pPr>
           <a:r>
-            <a:rPr lang="en-US" sz="1900" kern="1200" dirty="0" err="1"/>
+            <a:rPr lang="en-US" sz="1900" kern="1200" dirty="0" err="1">
+              <a:latin typeface="Georgia" panose="02040502050405020303" pitchFamily="18" charset="0"/>
+            </a:rPr>
             <a:t>Hee</a:t>
           </a:r>
           <a:r>
-            <a:rPr lang="en-US" sz="1900" kern="1200" dirty="0"/>
+            <a:rPr lang="en-US" sz="1900" kern="1200" dirty="0">
+              <a:latin typeface="Georgia" panose="02040502050405020303" pitchFamily="18" charset="0"/>
+            </a:rPr>
             <a:t> </a:t>
           </a:r>
           <a:r>
-            <a:rPr lang="en-US" sz="1900" kern="1200" dirty="0" err="1"/>
+            <a:rPr lang="en-US" sz="1900" kern="1200" dirty="0" err="1">
+              <a:latin typeface="Georgia" panose="02040502050405020303" pitchFamily="18" charset="0"/>
+            </a:rPr>
             <a:t>hee</a:t>
           </a:r>
           <a:r>
-            <a:rPr lang="en-US" sz="1900" kern="1200" dirty="0"/>
+            <a:rPr lang="en-US" sz="1900" kern="1200" dirty="0">
+              <a:latin typeface="Georgia" panose="02040502050405020303" pitchFamily="18" charset="0"/>
+            </a:rPr>
             <a:t> ha ha</a:t>
           </a:r>
         </a:p>
@@ -26244,63 +26308,15 @@
               </a:spcAft>
             </a:pPr>
             <a:r>
-              <a:rPr lang="en-US" sz="6400" i="1" dirty="0">
+              <a:rPr lang="en-US" sz="6400" dirty="0">
                 <a:solidFill>
                   <a:schemeClr val="tx2"/>
                 </a:solidFill>
-                <a:latin typeface="+mj-lt"/>
+                <a:latin typeface="Georgia" panose="02040502050405020303" pitchFamily="18" charset="0"/>
                 <a:ea typeface="+mj-ea"/>
-                <a:cs typeface="+mj-cs"/>
+                <a:cs typeface="Times New Roman" panose="02020603050405020304" pitchFamily="18" charset="0"/>
               </a:rPr>
               <a:t>Why your company should do this</a:t>
-            </a:r>
-          </a:p>
-        </p:txBody>
-      </p:sp>
-      <p:sp>
-        <p:nvSpPr>
-          <p:cNvPr id="6" name="TextBox 5">
-            <a:extLst>
-              <a:ext uri="{FF2B5EF4-FFF2-40B4-BE49-F238E27FC236}">
-                <a16:creationId xmlns:a16="http://schemas.microsoft.com/office/drawing/2014/main" id="{4C6D9F5B-C681-A33C-1120-E8757B378C17}"/>
-              </a:ext>
-            </a:extLst>
-          </p:cNvPr>
-          <p:cNvSpPr txBox="1"/>
-          <p:nvPr/>
-        </p:nvSpPr>
-        <p:spPr>
-          <a:xfrm>
-            <a:off x="4385412" y="4471416"/>
-            <a:ext cx="7355484" cy="1481328"/>
-          </a:xfrm>
-          <a:prstGeom prst="rect">
-            <a:avLst/>
-          </a:prstGeom>
-        </p:spPr>
-        <p:txBody>
-          <a:bodyPr vert="horz" lIns="0" tIns="0" rIns="91440" bIns="0" rtlCol="0">
-            <a:normAutofit/>
-          </a:bodyPr>
-          <a:lstStyle/>
-          <a:p>
-            <a:pPr>
-              <a:lnSpc>
-                <a:spcPct val="120000"/>
-              </a:lnSpc>
-              <a:spcBef>
-                <a:spcPts val="1000"/>
-              </a:spcBef>
-            </a:pPr>
-            <a:r>
-              <a:rPr lang="en-US" sz="2400">
-                <a:solidFill>
-                  <a:schemeClr val="tx2">
-                    <a:alpha val="55000"/>
-                  </a:schemeClr>
-                </a:solidFill>
-              </a:rPr>
-              <a:t>Presented by Kyle Matton, Axel Pestoni, Teddy Jones, and Nicholas Kasten</a:t>
             </a:r>
           </a:p>
         </p:txBody>
@@ -26357,6 +26373,76 @@
           </a:fontRef>
         </p:style>
       </p:cxnSp>
+      <p:sp>
+        <p:nvSpPr>
+          <p:cNvPr id="6" name="TextBox 5">
+            <a:extLst>
+              <a:ext uri="{FF2B5EF4-FFF2-40B4-BE49-F238E27FC236}">
+                <a16:creationId xmlns:a16="http://schemas.microsoft.com/office/drawing/2014/main" id="{4C6D9F5B-C681-A33C-1120-E8757B378C17}"/>
+              </a:ext>
+            </a:extLst>
+          </p:cNvPr>
+          <p:cNvSpPr txBox="1"/>
+          <p:nvPr/>
+        </p:nvSpPr>
+        <p:spPr>
+          <a:xfrm>
+            <a:off x="4385412" y="4471416"/>
+            <a:ext cx="7355484" cy="1481328"/>
+          </a:xfrm>
+          <a:prstGeom prst="rect">
+            <a:avLst/>
+          </a:prstGeom>
+        </p:spPr>
+        <p:txBody>
+          <a:bodyPr vert="horz" lIns="0" tIns="0" rIns="91440" bIns="0" rtlCol="0">
+            <a:normAutofit/>
+          </a:bodyPr>
+          <a:lstStyle/>
+          <a:p>
+            <a:pPr>
+              <a:lnSpc>
+                <a:spcPct val="120000"/>
+              </a:lnSpc>
+              <a:spcBef>
+                <a:spcPts val="1000"/>
+              </a:spcBef>
+            </a:pPr>
+            <a:r>
+              <a:rPr lang="en-US" sz="2400" dirty="0">
+                <a:solidFill>
+                  <a:schemeClr val="tx2">
+                    <a:alpha val="55000"/>
+                  </a:schemeClr>
+                </a:solidFill>
+                <a:latin typeface="Georgia" panose="02040502050405020303" pitchFamily="18" charset="0"/>
+              </a:rPr>
+              <a:t>Presented by Kyle Matton, Axel Pestoni, </a:t>
+            </a:r>
+          </a:p>
+          <a:p>
+            <a:pPr>
+              <a:lnSpc>
+                <a:spcPct val="120000"/>
+              </a:lnSpc>
+              <a:spcBef>
+                <a:spcPts val="1000"/>
+              </a:spcBef>
+            </a:pPr>
+            <a:r>
+              <a:rPr lang="en-US" sz="2400" dirty="0">
+                <a:solidFill>
+                  <a:schemeClr val="tx2">
+                    <a:alpha val="55000"/>
+                  </a:schemeClr>
+                </a:solidFill>
+                <a:latin typeface="Georgia" panose="02040502050405020303" pitchFamily="18" charset="0"/>
+              </a:rPr>
+              <a:t>Teddy Jones, and Nicholas Kasten</a:t>
+            </a:r>
+          </a:p>
+        </p:txBody>
+      </p:sp>
     </p:spTree>
     <p:extLst>
       <p:ext uri="{BB962C8B-B14F-4D97-AF65-F5344CB8AC3E}">
@@ -26409,7 +26495,9 @@
           <a:lstStyle/>
           <a:p>
             <a:r>
-              <a:rPr lang="en-US" dirty="0"/>
+              <a:rPr lang="en-US" dirty="0">
+                <a:latin typeface="Georgia" panose="02040502050405020303" pitchFamily="18" charset="0"/>
+              </a:rPr>
               <a:t>Keep on going soldier</a:t>
             </a:r>
           </a:p>
@@ -26615,7 +26703,9 @@
               </a:lnSpc>
             </a:pPr>
             <a:r>
-              <a:rPr lang="en-US" sz="6400" dirty="0"/>
+              <a:rPr lang="en-US" sz="6400" i="0" dirty="0">
+                <a:latin typeface="Georgia" panose="02040502050405020303" pitchFamily="18" charset="0"/>
+              </a:rPr>
               <a:t>Quick Introductions</a:t>
             </a:r>
           </a:p>
@@ -26855,7 +26945,9 @@
           <a:lstStyle/>
           <a:p>
             <a:r>
-              <a:rPr lang="en-US" sz="5000" dirty="0"/>
+              <a:rPr lang="en-US" sz="5000" i="0" dirty="0">
+                <a:latin typeface="Georgia" panose="02040502050405020303" pitchFamily="18" charset="0"/>
+              </a:rPr>
               <a:t>Stakeholders and the Problem at Hand</a:t>
             </a:r>
           </a:p>
@@ -27087,7 +27179,9 @@
           <a:lstStyle/>
           <a:p>
             <a:r>
-              <a:rPr lang="en-US"/>
+              <a:rPr lang="en-US" i="0" dirty="0">
+                <a:latin typeface="Georgia" panose="02040502050405020303" pitchFamily="18" charset="0"/>
+              </a:rPr>
               <a:t>Preparation and Methods of Analyses</a:t>
             </a:r>
           </a:p>
@@ -27161,7 +27255,7 @@
             <p:ph idx="1"/>
             <p:extLst>
               <p:ext uri="{D42A27DB-BD31-4B8C-83A1-F6EECF244321}">
-                <p14:modId xmlns:p14="http://schemas.microsoft.com/office/powerpoint/2010/main" val="1041600513"/>
+                <p14:modId xmlns:p14="http://schemas.microsoft.com/office/powerpoint/2010/main" val="811411763"/>
               </p:ext>
             </p:extLst>
           </p:nvPr>
@@ -27236,14 +27330,11 @@
           <a:lstStyle/>
           <a:p>
             <a:r>
-              <a:rPr lang="en-US" sz="6400" dirty="0">
-                <a:solidFill>
-                  <a:srgbClr val="867AD1"/>
-                </a:solidFill>
+              <a:rPr lang="en-US" sz="6400" i="0" dirty="0">
+                <a:latin typeface="Georgia" panose="02040502050405020303" pitchFamily="18" charset="0"/>
               </a:rPr>
               <a:t>First Insight</a:t>
             </a:r>
-            <a:endParaRPr lang="en-US" sz="6400" dirty="0"/>
           </a:p>
         </p:txBody>
       </p:sp>
@@ -27389,14 +27480,11 @@
           <a:lstStyle/>
           <a:p>
             <a:r>
-              <a:rPr lang="en-US" sz="6400" dirty="0">
-                <a:solidFill>
-                  <a:srgbClr val="867AD1"/>
-                </a:solidFill>
+              <a:rPr lang="en-US" sz="6400" i="0" dirty="0">
+                <a:latin typeface="Georgia" panose="02040502050405020303" pitchFamily="18" charset="0"/>
               </a:rPr>
               <a:t>Second Insight</a:t>
             </a:r>
-            <a:endParaRPr lang="en-US" sz="6400" dirty="0"/>
           </a:p>
         </p:txBody>
       </p:sp>
@@ -27599,7 +27687,9 @@
           <a:lstStyle/>
           <a:p>
             <a:r>
-              <a:rPr lang="en-US"/>
+              <a:rPr lang="en-US" sz="3800" i="0" dirty="0">
+                <a:latin typeface="Georgia" panose="02040502050405020303" pitchFamily="18" charset="0"/>
+              </a:rPr>
               <a:t>Action Plan</a:t>
             </a:r>
           </a:p>
@@ -27673,7 +27763,7 @@
             <p:ph idx="1"/>
             <p:extLst>
               <p:ext uri="{D42A27DB-BD31-4B8C-83A1-F6EECF244321}">
-                <p14:modId xmlns:p14="http://schemas.microsoft.com/office/powerpoint/2010/main" val="2626549935"/>
+                <p14:modId xmlns:p14="http://schemas.microsoft.com/office/powerpoint/2010/main" val="2711866080"/>
               </p:ext>
             </p:extLst>
           </p:nvPr>
@@ -27742,14 +27832,11 @@
           <a:lstStyle/>
           <a:p>
             <a:r>
-              <a:rPr lang="en-US" sz="5400" dirty="0">
-                <a:solidFill>
-                  <a:srgbClr val="867AD1"/>
-                </a:solidFill>
+              <a:rPr lang="en-US" sz="5400" i="0" dirty="0">
+                <a:latin typeface="Georgia" panose="02040502050405020303" pitchFamily="18" charset="0"/>
               </a:rPr>
               <a:t>Limitations</a:t>
             </a:r>
-            <a:endParaRPr lang="en-US" sz="5400" dirty="0"/>
           </a:p>
         </p:txBody>
       </p:sp>
@@ -27956,12 +28043,10 @@
           <a:lstStyle/>
           <a:p>
             <a:r>
-              <a:rPr lang="en-US" sz="6400" dirty="0">
-                <a:solidFill>
-                  <a:schemeClr val="accent2"/>
-                </a:solidFill>
+              <a:rPr lang="en-US" sz="6400" i="0" dirty="0">
+                <a:latin typeface="Georgia" panose="02040502050405020303" pitchFamily="18" charset="0"/>
               </a:rPr>
-              <a:t>Circling Back</a:t>
+              <a:t>In Summary</a:t>
             </a:r>
           </a:p>
         </p:txBody>

</xml_diff>